<commit_message>
Modified Akash Survey presentation
</commit_message>
<xml_diff>
--- a/EmailSecurity/Akash_Survey_Presentation/Akash_Singh_Survey.pptx
+++ b/EmailSecurity/Akash_Survey_Presentation/Akash_Singh_Survey.pptx
@@ -318,7 +318,7 @@
           <a:p>
             <a:fld id="{4AAD347D-5ACD-4C99-B74B-A9C85AD731AF}" type="datetimeFigureOut">
               <a:rPr lang="en-US" smtClean="0"/>
-              <a:t>12/1/15</a:t>
+              <a:t>12/2/15</a:t>
             </a:fld>
             <a:endParaRPr lang="en-US" dirty="0"/>
           </a:p>
@@ -528,7 +528,7 @@
           <a:p>
             <a:fld id="{4509A250-FF31-4206-8172-F9D3106AACB1}" type="datetimeFigureOut">
               <a:rPr lang="en-US" smtClean="0"/>
-              <a:t>12/1/15</a:t>
+              <a:t>12/2/15</a:t>
             </a:fld>
             <a:endParaRPr lang="en-US" dirty="0"/>
           </a:p>
@@ -708,7 +708,7 @@
           <a:p>
             <a:fld id="{4509A250-FF31-4206-8172-F9D3106AACB1}" type="datetimeFigureOut">
               <a:rPr lang="en-US" smtClean="0"/>
-              <a:t>12/1/15</a:t>
+              <a:t>12/2/15</a:t>
             </a:fld>
             <a:endParaRPr lang="en-US" dirty="0"/>
           </a:p>
@@ -918,7 +918,7 @@
           <a:p>
             <a:fld id="{4509A250-FF31-4206-8172-F9D3106AACB1}" type="datetimeFigureOut">
               <a:rPr lang="en-US" smtClean="0"/>
-              <a:t>12/1/15</a:t>
+              <a:t>12/2/15</a:t>
             </a:fld>
             <a:endParaRPr lang="en-US" dirty="0"/>
           </a:p>
@@ -1213,7 +1213,7 @@
           <a:p>
             <a:fld id="{9796027F-7875-4030-9381-8BD8C4F21935}" type="datetimeFigureOut">
               <a:rPr lang="en-US" smtClean="0"/>
-              <a:t>12/1/15</a:t>
+              <a:t>12/2/15</a:t>
             </a:fld>
             <a:endParaRPr lang="en-US" dirty="0"/>
           </a:p>
@@ -1490,7 +1490,7 @@
           <a:p>
             <a:fld id="{9796027F-7875-4030-9381-8BD8C4F21935}" type="datetimeFigureOut">
               <a:rPr lang="en-US" smtClean="0"/>
-              <a:t>12/1/15</a:t>
+              <a:t>12/2/15</a:t>
             </a:fld>
             <a:endParaRPr lang="en-US" dirty="0"/>
           </a:p>
@@ -1897,7 +1897,7 @@
           <a:p>
             <a:fld id="{9796027F-7875-4030-9381-8BD8C4F21935}" type="datetimeFigureOut">
               <a:rPr lang="en-US" smtClean="0"/>
-              <a:t>12/1/15</a:t>
+              <a:t>12/2/15</a:t>
             </a:fld>
             <a:endParaRPr lang="en-US" dirty="0"/>
           </a:p>
@@ -2015,7 +2015,7 @@
           <a:p>
             <a:fld id="{4509A250-FF31-4206-8172-F9D3106AACB1}" type="datetimeFigureOut">
               <a:rPr lang="en-US" smtClean="0"/>
-              <a:t>12/1/15</a:t>
+              <a:t>12/2/15</a:t>
             </a:fld>
             <a:endParaRPr lang="en-US" dirty="0"/>
           </a:p>
@@ -2110,7 +2110,7 @@
           <a:p>
             <a:fld id="{4509A250-FF31-4206-8172-F9D3106AACB1}" type="datetimeFigureOut">
               <a:rPr lang="en-US" smtClean="0"/>
-              <a:t>12/1/15</a:t>
+              <a:t>12/2/15</a:t>
             </a:fld>
             <a:endParaRPr lang="en-US" dirty="0"/>
           </a:p>
@@ -2400,7 +2400,7 @@
           <a:p>
             <a:fld id="{4509A250-FF31-4206-8172-F9D3106AACB1}" type="datetimeFigureOut">
               <a:rPr lang="en-US" smtClean="0"/>
-              <a:t>12/1/15</a:t>
+              <a:t>12/2/15</a:t>
             </a:fld>
             <a:endParaRPr lang="en-US" dirty="0"/>
           </a:p>
@@ -2680,7 +2680,7 @@
           <a:p>
             <a:fld id="{4509A250-FF31-4206-8172-F9D3106AACB1}" type="datetimeFigureOut">
               <a:rPr lang="en-US" smtClean="0"/>
-              <a:t>12/1/15</a:t>
+              <a:t>12/2/15</a:t>
             </a:fld>
             <a:endParaRPr lang="en-US" dirty="0"/>
           </a:p>
@@ -2930,7 +2930,7 @@
           <a:p>
             <a:fld id="{4AAD347D-5ACD-4C99-B74B-A9C85AD731AF}" type="datetimeFigureOut">
               <a:rPr lang="en-US" smtClean="0"/>
-              <a:t>12/1/15</a:t>
+              <a:t>12/2/15</a:t>
             </a:fld>
             <a:endParaRPr lang="en-US" dirty="0"/>
           </a:p>
@@ -3520,7 +3520,11 @@
           <a:p>
             <a:r>
               <a:rPr lang="en-US" dirty="0" smtClean="0"/>
-              <a:t>Hash-Based Message Authentication Codes </a:t>
+              <a:t>Message </a:t>
+            </a:r>
+            <a:r>
+              <a:rPr lang="en-US" dirty="0" smtClean="0"/>
+              <a:t>Authentication Codes </a:t>
             </a:r>
             <a:endParaRPr lang="en-US" dirty="0"/>
           </a:p>
@@ -3548,13 +3552,11 @@
           <a:p>
             <a:r>
               <a:rPr lang="en-US" dirty="0" smtClean="0"/>
-              <a:t>A detailed study and review</a:t>
-            </a:r>
-          </a:p>
-          <a:p>
-            <a:r>
-              <a:rPr lang="en-US" dirty="0" smtClean="0"/>
-              <a:t>of applications</a:t>
+              <a:t>A </a:t>
+            </a:r>
+            <a:r>
+              <a:rPr lang="en-US" dirty="0" smtClean="0"/>
+              <a:t>comparative study</a:t>
             </a:r>
             <a:endParaRPr lang="en-US" dirty="0"/>
           </a:p>
@@ -3600,6 +3602,13 @@
   <p:clrMapOvr>
     <a:masterClrMapping/>
   </p:clrMapOvr>
+  <p:timing>
+    <p:tnLst>
+      <p:par>
+        <p:cTn id="1" dur="indefinite" restart="never" nodeType="tmRoot"/>
+      </p:par>
+    </p:tnLst>
+  </p:timing>
 </p:sld>
 </file>
 
@@ -3999,6 +4008,13 @@
   <p:clrMapOvr>
     <a:masterClrMapping/>
   </p:clrMapOvr>
+  <p:timing>
+    <p:tnLst>
+      <p:par>
+        <p:cTn id="1" dur="indefinite" restart="never" nodeType="tmRoot"/>
+      </p:par>
+    </p:tnLst>
+  </p:timing>
 </p:sld>
 </file>
 
@@ -4129,6 +4145,13 @@
   <p:clrMapOvr>
     <a:masterClrMapping/>
   </p:clrMapOvr>
+  <p:timing>
+    <p:tnLst>
+      <p:par>
+        <p:cTn id="1" dur="indefinite" restart="never" nodeType="tmRoot"/>
+      </p:par>
+    </p:tnLst>
+  </p:timing>
 </p:sld>
 </file>
 
@@ -4475,6 +4498,13 @@
   <p:clrMapOvr>
     <a:masterClrMapping/>
   </p:clrMapOvr>
+  <p:timing>
+    <p:tnLst>
+      <p:par>
+        <p:cTn id="1" dur="indefinite" restart="never" nodeType="tmRoot"/>
+      </p:par>
+    </p:tnLst>
+  </p:timing>
 </p:sld>
 </file>
 
@@ -4657,6 +4687,13 @@
   <p:clrMapOvr>
     <a:masterClrMapping/>
   </p:clrMapOvr>
+  <p:timing>
+    <p:tnLst>
+      <p:par>
+        <p:cTn id="1" dur="indefinite" restart="never" nodeType="tmRoot"/>
+      </p:par>
+    </p:tnLst>
+  </p:timing>
 </p:sld>
 </file>
 
@@ -4770,8 +4807,8 @@
         </p:nvSpPr>
         <p:spPr>
           <a:xfrm>
-            <a:off x="6929718" y="4025153"/>
-            <a:ext cx="4953215" cy="369332"/>
+            <a:off x="226032" y="3977393"/>
+            <a:ext cx="1900718" cy="1200329"/>
           </a:xfrm>
           <a:prstGeom prst="rect">
             <a:avLst/>
@@ -4779,7 +4816,7 @@
           <a:noFill/>
         </p:spPr>
         <p:txBody>
-          <a:bodyPr wrap="none" rtlCol="0">
+          <a:bodyPr wrap="square" rtlCol="0">
             <a:spAutoFit/>
           </a:bodyPr>
           <a:lstStyle/>
@@ -4789,6 +4826,145 @@
               <a:t>Figure: SHA-1 internal structure (Source: Wikipedia)</a:t>
             </a:r>
             <a:endParaRPr lang="en-US" dirty="0"/>
+          </a:p>
+        </p:txBody>
+      </p:sp>
+      <p:sp>
+        <p:nvSpPr>
+          <p:cNvPr id="6" name="TextBox 5"/>
+          <p:cNvSpPr txBox="1"/>
+          <p:nvPr/>
+        </p:nvSpPr>
+        <p:spPr>
+          <a:xfrm>
+            <a:off x="6280979" y="2531573"/>
+            <a:ext cx="5719238" cy="4247317"/>
+          </a:xfrm>
+          <a:prstGeom prst="rect">
+            <a:avLst/>
+          </a:prstGeom>
+          <a:noFill/>
+        </p:spPr>
+        <p:txBody>
+          <a:bodyPr wrap="square" rtlCol="0">
+            <a:spAutoFit/>
+          </a:bodyPr>
+          <a:lstStyle/>
+          <a:p>
+            <a:pPr marL="285750" indent="-285750">
+              <a:buFont typeface="Arial" charset="0"/>
+              <a:buChar char="•"/>
+            </a:pPr>
+            <a:r>
+              <a:rPr lang="en-US" dirty="0"/>
+              <a:t>T</a:t>
+            </a:r>
+            <a:r>
+              <a:rPr lang="en-US" dirty="0" smtClean="0"/>
+              <a:t>he </a:t>
+            </a:r>
+            <a:r>
+              <a:rPr lang="en-US" dirty="0"/>
+              <a:t>message is padded before digesting as described before</a:t>
+            </a:r>
+            <a:r>
+              <a:rPr lang="en-US" dirty="0" smtClean="0"/>
+              <a:t>.</a:t>
+            </a:r>
+          </a:p>
+          <a:p>
+            <a:pPr marL="285750" indent="-285750">
+              <a:buFont typeface="Arial" charset="0"/>
+              <a:buChar char="•"/>
+            </a:pPr>
+            <a:r>
+              <a:rPr lang="en-US" dirty="0"/>
+              <a:t>It involves two buffers, each of which have five 32bit words</a:t>
+            </a:r>
+            <a:r>
+              <a:rPr lang="en-US" dirty="0" smtClean="0"/>
+              <a:t>.</a:t>
+            </a:r>
+          </a:p>
+          <a:p>
+            <a:pPr marL="285750" indent="-285750">
+              <a:buFont typeface="Arial" charset="0"/>
+              <a:buChar char="•"/>
+            </a:pPr>
+            <a:r>
+              <a:rPr lang="en-US" dirty="0"/>
+              <a:t>It also involves a sequence of eighty 32bit words</a:t>
+            </a:r>
+            <a:r>
+              <a:rPr lang="en-US" dirty="0" smtClean="0"/>
+              <a:t>.</a:t>
+            </a:r>
+          </a:p>
+          <a:p>
+            <a:pPr marL="285750" indent="-285750">
+              <a:buFont typeface="Arial" charset="0"/>
+              <a:buChar char="•"/>
+            </a:pPr>
+            <a:r>
+              <a:rPr lang="en-US" dirty="0"/>
+              <a:t>The words of the first 5-word buffer are named A,B,C,D and E</a:t>
+            </a:r>
+            <a:r>
+              <a:rPr lang="en-US" dirty="0" smtClean="0"/>
+              <a:t>.</a:t>
+            </a:r>
+          </a:p>
+          <a:p>
+            <a:pPr marL="285750" indent="-285750">
+              <a:buFont typeface="Arial" charset="0"/>
+              <a:buChar char="•"/>
+            </a:pPr>
+            <a:r>
+              <a:rPr lang="en-US" dirty="0"/>
+              <a:t>The words of the second 5-word buffer are named H0,H1,H2,H3 and H4.</a:t>
+            </a:r>
+            <a:r>
+              <a:rPr lang="en-US" dirty="0" smtClean="0"/>
+              <a:t> </a:t>
+            </a:r>
+          </a:p>
+          <a:p>
+            <a:pPr marL="285750" indent="-285750">
+              <a:buFont typeface="Arial" charset="0"/>
+              <a:buChar char="•"/>
+            </a:pPr>
+            <a:r>
+              <a:rPr lang="en-US" dirty="0"/>
+              <a:t>The words of the eighty word sequence are named W(0),W(1).......W(79</a:t>
+            </a:r>
+            <a:r>
+              <a:rPr lang="en-US" dirty="0" smtClean="0"/>
+              <a:t>).</a:t>
+            </a:r>
+          </a:p>
+          <a:p>
+            <a:pPr marL="285750" indent="-285750">
+              <a:buFont typeface="Arial" charset="0"/>
+              <a:buChar char="•"/>
+            </a:pPr>
+            <a:r>
+              <a:rPr lang="en-US" dirty="0"/>
+              <a:t> To obtain the message digest, the individual message blocks of 512bits each processed in order</a:t>
+            </a:r>
+            <a:r>
+              <a:rPr lang="en-US" dirty="0" smtClean="0"/>
+              <a:t>.</a:t>
+            </a:r>
+          </a:p>
+          <a:p>
+            <a:pPr marL="285750" indent="-285750">
+              <a:buFont typeface="Arial" charset="0"/>
+              <a:buChar char="•"/>
+            </a:pPr>
+            <a:r>
+              <a:rPr lang="en-US" dirty="0"/>
+              <a:t> After processing, the message digest is the 160bit string given by the 5 words H0 H1 H2 H3 H4 [4]. </a:t>
+            </a:r>
           </a:p>
         </p:txBody>
       </p:sp>
@@ -4802,6 +4978,13 @@
   <p:clrMapOvr>
     <a:masterClrMapping/>
   </p:clrMapOvr>
+  <p:timing>
+    <p:tnLst>
+      <p:par>
+        <p:cTn id="1" dur="indefinite" restart="never" nodeType="tmRoot"/>
+      </p:par>
+    </p:tnLst>
+  </p:timing>
 </p:sld>
 </file>
 
@@ -4927,6 +5110,13 @@
   <p:clrMapOvr>
     <a:masterClrMapping/>
   </p:clrMapOvr>
+  <p:timing>
+    <p:tnLst>
+      <p:par>
+        <p:cTn id="1" dur="indefinite" restart="never" nodeType="tmRoot"/>
+      </p:par>
+    </p:tnLst>
+  </p:timing>
 </p:sld>
 </file>
 
@@ -5161,6 +5351,13 @@
   <p:clrMapOvr>
     <a:masterClrMapping/>
   </p:clrMapOvr>
+  <p:timing>
+    <p:tnLst>
+      <p:par>
+        <p:cTn id="1" dur="indefinite" restart="never" nodeType="tmRoot"/>
+      </p:par>
+    </p:tnLst>
+  </p:timing>
 </p:sld>
 </file>
 
@@ -5293,6 +5490,13 @@
   <p:clrMapOvr>
     <a:masterClrMapping/>
   </p:clrMapOvr>
+  <p:timing>
+    <p:tnLst>
+      <p:par>
+        <p:cTn id="1" dur="indefinite" restart="never" nodeType="tmRoot"/>
+      </p:par>
+    </p:tnLst>
+  </p:timing>
 </p:sld>
 </file>
 
@@ -5426,6 +5630,13 @@
   <p:clrMapOvr>
     <a:masterClrMapping/>
   </p:clrMapOvr>
+  <p:timing>
+    <p:tnLst>
+      <p:par>
+        <p:cTn id="1" dur="indefinite" restart="never" nodeType="tmRoot"/>
+      </p:par>
+    </p:tnLst>
+  </p:timing>
 </p:sld>
 </file>
 
@@ -5568,6 +5779,13 @@
   <p:clrMapOvr>
     <a:masterClrMapping/>
   </p:clrMapOvr>
+  <p:timing>
+    <p:tnLst>
+      <p:par>
+        <p:cTn id="1" dur="indefinite" restart="never" nodeType="tmRoot"/>
+      </p:par>
+    </p:tnLst>
+  </p:timing>
 </p:sld>
 </file>
 
@@ -5678,6 +5896,13 @@
   <p:clrMapOvr>
     <a:masterClrMapping/>
   </p:clrMapOvr>
+  <p:timing>
+    <p:tnLst>
+      <p:par>
+        <p:cTn id="1" dur="indefinite" restart="never" nodeType="tmRoot"/>
+      </p:par>
+    </p:tnLst>
+  </p:timing>
 </p:sld>
 </file>
 
@@ -5870,6 +6095,13 @@
   <p:clrMapOvr>
     <a:masterClrMapping/>
   </p:clrMapOvr>
+  <p:timing>
+    <p:tnLst>
+      <p:par>
+        <p:cTn id="1" dur="indefinite" restart="never" nodeType="tmRoot"/>
+      </p:par>
+    </p:tnLst>
+  </p:timing>
 </p:sld>
 </file>
 
@@ -6030,6 +6262,13 @@
   <p:clrMapOvr>
     <a:masterClrMapping/>
   </p:clrMapOvr>
+  <p:timing>
+    <p:tnLst>
+      <p:par>
+        <p:cTn id="1" dur="indefinite" restart="never" nodeType="tmRoot"/>
+      </p:par>
+    </p:tnLst>
+  </p:timing>
 </p:sld>
 </file>
 
@@ -6130,6 +6369,13 @@
   <p:clrMapOvr>
     <a:masterClrMapping/>
   </p:clrMapOvr>
+  <p:timing>
+    <p:tnLst>
+      <p:par>
+        <p:cTn id="1" dur="indefinite" restart="never" nodeType="tmRoot"/>
+      </p:par>
+    </p:tnLst>
+  </p:timing>
 </p:sld>
 </file>
 
@@ -6312,6 +6558,13 @@
   <p:clrMapOvr>
     <a:masterClrMapping/>
   </p:clrMapOvr>
+  <p:timing>
+    <p:tnLst>
+      <p:par>
+        <p:cTn id="1" dur="indefinite" restart="never" nodeType="tmRoot"/>
+      </p:par>
+    </p:tnLst>
+  </p:timing>
 </p:sld>
 </file>
 
@@ -6415,6 +6668,13 @@
   <p:clrMapOvr>
     <a:masterClrMapping/>
   </p:clrMapOvr>
+  <p:timing>
+    <p:tnLst>
+      <p:par>
+        <p:cTn id="1" dur="indefinite" restart="never" nodeType="tmRoot"/>
+      </p:par>
+    </p:tnLst>
+  </p:timing>
 </p:sld>
 </file>
 

</xml_diff>